<commit_message>
final updates before workshop
</commit_message>
<xml_diff>
--- a/2018-02-05_BroadE_workshop/slides/2018-02-05_03_DataPrep.pptx
+++ b/2018-02-05_BroadE_workshop/slides/2018-02-05_03_DataPrep.pptx
@@ -10,7 +10,7 @@
     <p:sldMasterId id="2147483730" r:id="rId6"/>
   </p:sldMasterIdLst>
   <p:notesMasterIdLst>
-    <p:notesMasterId r:id="rId19"/>
+    <p:notesMasterId r:id="rId20"/>
   </p:notesMasterIdLst>
   <p:sldIdLst>
     <p:sldId id="256" r:id="rId7"/>
@@ -25,26 +25,27 @@
     <p:sldId id="265" r:id="rId16"/>
     <p:sldId id="266" r:id="rId17"/>
     <p:sldId id="267" r:id="rId18"/>
+    <p:sldId id="268" r:id="rId19"/>
   </p:sldIdLst>
   <p:sldSz cx="9144000" cy="6858000" type="screen4x3"/>
   <p:notesSz cx="6858000" cy="9144000"/>
   <p:embeddedFontLst>
     <p:embeddedFont>
       <p:font typeface="Calibri Light" panose="020F0302020204030204" pitchFamily="34" charset="0"/>
-      <p:regular r:id="rId20"/>
-      <p:italic r:id="rId21"/>
+      <p:regular r:id="rId21"/>
+      <p:italic r:id="rId22"/>
     </p:embeddedFont>
     <p:embeddedFont>
       <p:font typeface="Calibri" panose="020F0502020204030204" pitchFamily="34" charset="0"/>
-      <p:regular r:id="rId22"/>
-      <p:bold r:id="rId23"/>
-      <p:italic r:id="rId24"/>
-      <p:boldItalic r:id="rId25"/>
+      <p:regular r:id="rId23"/>
+      <p:bold r:id="rId24"/>
+      <p:italic r:id="rId25"/>
+      <p:boldItalic r:id="rId26"/>
     </p:embeddedFont>
     <p:embeddedFont>
       <p:font typeface="Tahoma" panose="020B0604030504040204" pitchFamily="34" charset="0"/>
-      <p:regular r:id="rId26"/>
-      <p:bold r:id="rId27"/>
+      <p:regular r:id="rId27"/>
+      <p:bold r:id="rId28"/>
     </p:embeddedFont>
   </p:embeddedFontLst>
   <p:defaultTextStyle>
@@ -1687,11 +1688,7 @@
             </a:r>
             <a:r>
               <a:rPr lang="en-US" baseline="0" dirty="0" smtClean="0"/>
-              <a:t> takes less than a </a:t>
-            </a:r>
-            <a:r>
-              <a:rPr lang="en-US" baseline="0" dirty="0" smtClean="0"/>
-              <a:t>minute – note that it can take a little bit for the cell to collapse, as it is connecting to all of </a:t>
+              <a:t> takes less than a minute – note that it can take a little bit for the cell to collapse, as it is connecting to all of </a:t>
             </a:r>
             <a:r>
               <a:rPr lang="en-US" baseline="0" smtClean="0"/>
@@ -13410,7 +13407,7 @@
           <a:p>
             <a:fld id="{C764DE79-268F-4C1A-8933-263129D2AF90}" type="datetimeFigureOut">
               <a:rPr lang="en-US" dirty="0"/>
-              <a:t>1/31/2018</a:t>
+              <a:t>2/4/2018</a:t>
             </a:fld>
             <a:endParaRPr lang="en-US" dirty="0"/>
           </a:p>
@@ -17217,6 +17214,98 @@
       </p:par>
     </p:tnLst>
   </p:timing>
+</p:sld>
+</file>
+
+<file path=ppt/slides/slide13.xml><?xml version="1.0" encoding="utf-8"?>
+<p:sld xmlns:a="http://schemas.openxmlformats.org/drawingml/2006/main" xmlns:r="http://schemas.openxmlformats.org/officeDocument/2006/relationships" xmlns:p="http://schemas.openxmlformats.org/presentationml/2006/main">
+  <p:cSld>
+    <p:spTree>
+      <p:nvGrpSpPr>
+        <p:cNvPr id="1" name=""/>
+        <p:cNvGrpSpPr/>
+        <p:nvPr/>
+      </p:nvGrpSpPr>
+      <p:grpSpPr>
+        <a:xfrm>
+          <a:off x="0" y="0"/>
+          <a:ext cx="0" cy="0"/>
+          <a:chOff x="0" y="0"/>
+          <a:chExt cx="0" cy="0"/>
+        </a:xfrm>
+      </p:grpSpPr>
+      <p:sp>
+        <p:nvSpPr>
+          <p:cNvPr id="2" name="TextBox 1"/>
+          <p:cNvSpPr txBox="1"/>
+          <p:nvPr/>
+        </p:nvSpPr>
+        <p:spPr>
+          <a:xfrm>
+            <a:off x="727024" y="2625211"/>
+            <a:ext cx="9144000" cy="769441"/>
+          </a:xfrm>
+          <a:prstGeom prst="rect">
+            <a:avLst/>
+          </a:prstGeom>
+          <a:noFill/>
+        </p:spPr>
+        <p:txBody>
+          <a:bodyPr wrap="square" rtlCol="0">
+            <a:spAutoFit/>
+          </a:bodyPr>
+          <a:lstStyle/>
+          <a:p>
+            <a:pPr algn="ctr"/>
+            <a:r>
+              <a:rPr lang="en-US" sz="4400" b="1" dirty="0" smtClean="0">
+                <a:latin typeface="+mn-lt"/>
+              </a:rPr>
+              <a:t>Break (15 minutes)</a:t>
+            </a:r>
+            <a:endParaRPr lang="en-US" sz="4400" b="1" dirty="0">
+              <a:latin typeface="+mn-lt"/>
+            </a:endParaRPr>
+          </a:p>
+        </p:txBody>
+      </p:sp>
+      <p:pic>
+        <p:nvPicPr>
+          <p:cNvPr id="3" name="Shape 178"/>
+          <p:cNvPicPr preferRelativeResize="0"/>
+          <p:nvPr/>
+        </p:nvPicPr>
+        <p:blipFill rotWithShape="1">
+          <a:blip r:embed="rId2">
+            <a:alphaModFix/>
+          </a:blip>
+          <a:srcRect/>
+          <a:stretch/>
+        </p:blipFill>
+        <p:spPr>
+          <a:xfrm>
+            <a:off x="1434946" y="2301549"/>
+            <a:ext cx="1359637" cy="1416763"/>
+          </a:xfrm>
+          <a:prstGeom prst="rect">
+            <a:avLst/>
+          </a:prstGeom>
+          <a:noFill/>
+          <a:ln>
+            <a:noFill/>
+          </a:ln>
+        </p:spPr>
+      </p:pic>
+    </p:spTree>
+    <p:extLst>
+      <p:ext uri="{BB962C8B-B14F-4D97-AF65-F5344CB8AC3E}">
+        <p14:creationId xmlns:p14="http://schemas.microsoft.com/office/powerpoint/2010/main" val="3720896243"/>
+      </p:ext>
+    </p:extLst>
+  </p:cSld>
+  <p:clrMapOvr>
+    <a:masterClrMapping/>
+  </p:clrMapOvr>
 </p:sld>
 </file>
 

</xml_diff>